<commit_message>
Update fonts to Microsoft Defaults
</commit_message>
<xml_diff>
--- a/video_documents/logarithmic_equations/logarithmic_equations.pptx
+++ b/video_documents/logarithmic_equations/logarithmic_equations.pptx
@@ -185,7 +185,7 @@
                 <a:solidFill>
                   <a:srgbClr val="1F2882"/>
                 </a:solidFill>
-                <a:latin typeface="TeX Gyre Adventor" panose="02000503020200000004" pitchFamily="50" charset="0"/>
+                <a:latin typeface="Constantia" panose="02030602050306030303" pitchFamily="18" charset="0"/>
                 <a:ea typeface="TeX Gyre Adventor" panose="02000503020200000004" pitchFamily="50" charset="0"/>
                 <a:cs typeface="TeX Gyre Adventor" panose="02000503020200000004" pitchFamily="50" charset="0"/>
               </a:defRPr>
@@ -193,10 +193,9 @@
           </a:lstStyle>
           <a:p>
             <a:r>
-              <a:rPr lang="en-US"/>
+              <a:rPr lang="en-US" dirty="0"/>
               <a:t>Click to edit Master title style</a:t>
             </a:r>
-            <a:endParaRPr lang="en-US" dirty="0"/>
           </a:p>
         </p:txBody>
       </p:sp>
@@ -232,11 +231,11 @@
           <a:lstStyle>
             <a:lvl1pPr marL="0" indent="0" algn="ctr">
               <a:buNone/>
-              <a:defRPr sz="3600">
+              <a:defRPr sz="3600" b="1">
                 <a:solidFill>
                   <a:srgbClr val="1F2882"/>
                 </a:solidFill>
-                <a:latin typeface="TeX Gyre Adventor" panose="02000503020200000004" pitchFamily="50" charset="0"/>
+                <a:latin typeface="Constantia" panose="02030602050306030303" pitchFamily="18" charset="0"/>
                 <a:ea typeface="TeX Gyre Adventor" panose="02000503020200000004" pitchFamily="50" charset="0"/>
                 <a:cs typeface="TeX Gyre Adventor" panose="02000503020200000004" pitchFamily="50" charset="0"/>
               </a:defRPr>
@@ -276,10 +275,9 @@
           </a:lstStyle>
           <a:p>
             <a:r>
-              <a:rPr lang="en-US"/>
+              <a:rPr lang="en-US" dirty="0"/>
               <a:t>Click to edit Master subtitle style</a:t>
             </a:r>
-            <a:endParaRPr lang="en-US" dirty="0"/>
           </a:p>
         </p:txBody>
       </p:sp>
@@ -3151,10 +3149,9 @@
           <a:lstStyle/>
           <a:p>
             <a:r>
-              <a:rPr lang="en-US"/>
+              <a:rPr lang="en-US" dirty="0"/>
               <a:t>Click to edit Master title style</a:t>
             </a:r>
-            <a:endParaRPr lang="en-US" dirty="0"/>
           </a:p>
         </p:txBody>
       </p:sp>
@@ -3194,38 +3191,37 @@
           <a:p>
             <a:pPr lvl="0"/>
             <a:r>
-              <a:rPr lang="en-US"/>
+              <a:rPr lang="en-US" dirty="0"/>
               <a:t>Click to edit Master text styles</a:t>
             </a:r>
           </a:p>
           <a:p>
             <a:pPr lvl="1"/>
             <a:r>
-              <a:rPr lang="en-US"/>
+              <a:rPr lang="en-US" dirty="0"/>
               <a:t>Second level</a:t>
             </a:r>
           </a:p>
           <a:p>
             <a:pPr lvl="2"/>
             <a:r>
-              <a:rPr lang="en-US"/>
+              <a:rPr lang="en-US" dirty="0"/>
               <a:t>Third level</a:t>
             </a:r>
           </a:p>
           <a:p>
             <a:pPr lvl="3"/>
             <a:r>
-              <a:rPr lang="en-US"/>
+              <a:rPr lang="en-US" dirty="0"/>
               <a:t>Fourth level</a:t>
             </a:r>
           </a:p>
           <a:p>
             <a:pPr lvl="4"/>
             <a:r>
-              <a:rPr lang="en-US"/>
+              <a:rPr lang="en-US" dirty="0"/>
               <a:t>Fifth level</a:t>
             </a:r>
-            <a:endParaRPr lang="en-US" dirty="0"/>
           </a:p>
         </p:txBody>
       </p:sp>
@@ -3404,9 +3400,9 @@
           <a:solidFill>
             <a:schemeClr val="tx1"/>
           </a:solidFill>
-          <a:latin typeface="TeXGyreHeros" panose="00000500000000000000" pitchFamily="50" charset="0"/>
-          <a:ea typeface="TeX Gyre Adventor" panose="02000503020200000004" pitchFamily="50" charset="0"/>
-          <a:cs typeface="TeX Gyre Adventor" panose="02000503020200000004" pitchFamily="50" charset="0"/>
+          <a:latin typeface="Calibri" panose="020F0502020204030204" pitchFamily="34" charset="0"/>
+          <a:ea typeface="Calibri" panose="020F0502020204030204" pitchFamily="34" charset="0"/>
+          <a:cs typeface="Calibri" panose="020F0502020204030204" pitchFamily="34" charset="0"/>
         </a:defRPr>
       </a:lvl1pPr>
     </p:titleStyle>
@@ -3424,8 +3420,8 @@
           <a:solidFill>
             <a:schemeClr val="tx1"/>
           </a:solidFill>
-          <a:latin typeface="TeXGyreTermes" panose="00000500000000000000" pitchFamily="50" charset="0"/>
-          <a:ea typeface="+mn-ea"/>
+          <a:latin typeface="Cambria" panose="02040503050406030204" pitchFamily="18" charset="0"/>
+          <a:ea typeface="Cambria" panose="02040503050406030204" pitchFamily="18" charset="0"/>
           <a:cs typeface="+mn-cs"/>
         </a:defRPr>
       </a:lvl1pPr>
@@ -3442,8 +3438,8 @@
           <a:solidFill>
             <a:schemeClr val="tx1"/>
           </a:solidFill>
-          <a:latin typeface="TeXGyreTermes" panose="00000500000000000000" pitchFamily="50" charset="0"/>
-          <a:ea typeface="+mn-ea"/>
+          <a:latin typeface="Cambria" panose="02040503050406030204" pitchFamily="18" charset="0"/>
+          <a:ea typeface="Cambria" panose="02040503050406030204" pitchFamily="18" charset="0"/>
           <a:cs typeface="+mn-cs"/>
         </a:defRPr>
       </a:lvl2pPr>
@@ -3460,8 +3456,8 @@
           <a:solidFill>
             <a:schemeClr val="tx1"/>
           </a:solidFill>
-          <a:latin typeface="TeXGyreTermes" panose="00000500000000000000" pitchFamily="50" charset="0"/>
-          <a:ea typeface="+mn-ea"/>
+          <a:latin typeface="Cambria" panose="02040503050406030204" pitchFamily="18" charset="0"/>
+          <a:ea typeface="Cambria" panose="02040503050406030204" pitchFamily="18" charset="0"/>
           <a:cs typeface="+mn-cs"/>
         </a:defRPr>
       </a:lvl3pPr>
@@ -3478,8 +3474,8 @@
           <a:solidFill>
             <a:schemeClr val="tx1"/>
           </a:solidFill>
-          <a:latin typeface="TeXGyreTermes" panose="00000500000000000000" pitchFamily="50" charset="0"/>
-          <a:ea typeface="+mn-ea"/>
+          <a:latin typeface="Cambria" panose="02040503050406030204" pitchFamily="18" charset="0"/>
+          <a:ea typeface="Cambria" panose="02040503050406030204" pitchFamily="18" charset="0"/>
           <a:cs typeface="+mn-cs"/>
         </a:defRPr>
       </a:lvl4pPr>
@@ -3496,8 +3492,8 @@
           <a:solidFill>
             <a:schemeClr val="tx1"/>
           </a:solidFill>
-          <a:latin typeface="TeXGyreTermes" panose="00000500000000000000" pitchFamily="50" charset="0"/>
-          <a:ea typeface="+mn-ea"/>
+          <a:latin typeface="Cambria" panose="02040503050406030204" pitchFamily="18" charset="0"/>
+          <a:ea typeface="Cambria" panose="02040503050406030204" pitchFamily="18" charset="0"/>
           <a:cs typeface="+mn-cs"/>
         </a:defRPr>
       </a:lvl5pPr>
@@ -3813,8 +3809,8 @@
           </a:p>
         </p:txBody>
       </p:sp>
-      <mc:AlternateContent xmlns:mc="http://schemas.openxmlformats.org/markup-compatibility/2006">
-        <mc:Choice xmlns:a14="http://schemas.microsoft.com/office/drawing/2010/main" Requires="a14">
+      <mc:AlternateContent xmlns:mc="http://schemas.openxmlformats.org/markup-compatibility/2006" xmlns:a14="http://schemas.microsoft.com/office/drawing/2010/main">
+        <mc:Choice Requires="a14">
           <p:sp>
             <p:nvSpPr>
               <p:cNvPr id="3" name="Content Placeholder 2">
@@ -3905,7 +3901,7 @@
             </p:txBody>
           </p:sp>
         </mc:Choice>
-        <mc:Fallback>
+        <mc:Fallback xmlns="">
           <p:sp>
             <p:nvSpPr>
               <p:cNvPr id="3" name="Content Placeholder 2">
@@ -4704,8 +4700,8 @@
           </a:p>
         </p:txBody>
       </p:sp>
-      <mc:AlternateContent xmlns:mc="http://schemas.openxmlformats.org/markup-compatibility/2006">
-        <mc:Choice xmlns:a14="http://schemas.microsoft.com/office/drawing/2010/main" Requires="a14">
+      <mc:AlternateContent xmlns:mc="http://schemas.openxmlformats.org/markup-compatibility/2006" xmlns:a14="http://schemas.microsoft.com/office/drawing/2010/main">
+        <mc:Choice Requires="a14">
           <p:sp>
             <p:nvSpPr>
               <p:cNvPr id="3" name="Content Placeholder 2">
@@ -4810,7 +4806,7 @@
             </p:txBody>
           </p:sp>
         </mc:Choice>
-        <mc:Fallback>
+        <mc:Fallback xmlns="">
           <p:sp>
             <p:nvSpPr>
               <p:cNvPr id="3" name="Content Placeholder 2">
@@ -5163,8 +5159,8 @@
           </a:p>
         </p:txBody>
       </p:sp>
-      <mc:AlternateContent xmlns:mc="http://schemas.openxmlformats.org/markup-compatibility/2006">
-        <mc:Choice xmlns:a14="http://schemas.microsoft.com/office/drawing/2010/main" Requires="a14">
+      <mc:AlternateContent xmlns:mc="http://schemas.openxmlformats.org/markup-compatibility/2006" xmlns:a14="http://schemas.microsoft.com/office/drawing/2010/main">
+        <mc:Choice Requires="a14">
           <p:sp>
             <p:nvSpPr>
               <p:cNvPr id="5" name="Content Placeholder 4">
@@ -5214,7 +5210,7 @@
             </p:txBody>
           </p:sp>
         </mc:Choice>
-        <mc:Fallback>
+        <mc:Fallback xmlns="">
           <p:sp>
             <p:nvSpPr>
               <p:cNvPr id="5" name="Content Placeholder 4">
@@ -5464,8 +5460,8 @@
           </a:p>
         </p:txBody>
       </p:sp>
-      <mc:AlternateContent xmlns:mc="http://schemas.openxmlformats.org/markup-compatibility/2006">
-        <mc:Choice xmlns:a14="http://schemas.microsoft.com/office/drawing/2010/main" Requires="a14">
+      <mc:AlternateContent xmlns:mc="http://schemas.openxmlformats.org/markup-compatibility/2006" xmlns:a14="http://schemas.microsoft.com/office/drawing/2010/main">
+        <mc:Choice Requires="a14">
           <p:sp>
             <p:nvSpPr>
               <p:cNvPr id="3" name="Content Placeholder 2">
@@ -5589,7 +5585,7 @@
             </p:txBody>
           </p:sp>
         </mc:Choice>
-        <mc:Fallback>
+        <mc:Fallback xmlns="">
           <p:sp>
             <p:nvSpPr>
               <p:cNvPr id="3" name="Content Placeholder 2">
@@ -6426,8 +6422,8 @@
           </a:p>
         </p:txBody>
       </p:sp>
-      <mc:AlternateContent xmlns:mc="http://schemas.openxmlformats.org/markup-compatibility/2006">
-        <mc:Choice xmlns:a14="http://schemas.microsoft.com/office/drawing/2010/main" Requires="a14">
+      <mc:AlternateContent xmlns:mc="http://schemas.openxmlformats.org/markup-compatibility/2006" xmlns:a14="http://schemas.microsoft.com/office/drawing/2010/main">
+        <mc:Choice Requires="a14">
           <p:sp>
             <p:nvSpPr>
               <p:cNvPr id="5" name="Content Placeholder 4">
@@ -6570,7 +6566,7 @@
             </p:txBody>
           </p:sp>
         </mc:Choice>
-        <mc:Fallback>
+        <mc:Fallback xmlns="">
           <p:sp>
             <p:nvSpPr>
               <p:cNvPr id="5" name="Content Placeholder 4">
@@ -6610,8 +6606,8 @@
           </p:sp>
         </mc:Fallback>
       </mc:AlternateContent>
-      <mc:AlternateContent xmlns:mc="http://schemas.openxmlformats.org/markup-compatibility/2006">
-        <mc:Choice xmlns:a14="http://schemas.microsoft.com/office/drawing/2010/main" Requires="a14">
+      <mc:AlternateContent xmlns:mc="http://schemas.openxmlformats.org/markup-compatibility/2006" xmlns:a14="http://schemas.microsoft.com/office/drawing/2010/main">
+        <mc:Choice Requires="a14">
           <p:sp>
             <p:nvSpPr>
               <p:cNvPr id="6" name="Content Placeholder 5">
@@ -6765,7 +6761,7 @@
             </p:txBody>
           </p:sp>
         </mc:Choice>
-        <mc:Fallback>
+        <mc:Fallback xmlns="">
           <p:sp>
             <p:nvSpPr>
               <p:cNvPr id="6" name="Content Placeholder 5">
@@ -7325,8 +7321,8 @@
           </a:p>
         </p:txBody>
       </p:sp>
-      <mc:AlternateContent xmlns:mc="http://schemas.openxmlformats.org/markup-compatibility/2006">
-        <mc:Choice xmlns:a14="http://schemas.microsoft.com/office/drawing/2010/main" Requires="a14">
+      <mc:AlternateContent xmlns:mc="http://schemas.openxmlformats.org/markup-compatibility/2006" xmlns:a14="http://schemas.microsoft.com/office/drawing/2010/main">
+        <mc:Choice Requires="a14">
           <p:sp>
             <p:nvSpPr>
               <p:cNvPr id="3" name="Content Placeholder 2">
@@ -7417,7 +7413,7 @@
             </p:txBody>
           </p:sp>
         </mc:Choice>
-        <mc:Fallback>
+        <mc:Fallback xmlns="">
           <p:sp>
             <p:nvSpPr>
               <p:cNvPr id="3" name="Content Placeholder 2">
@@ -7764,8 +7760,8 @@
           </a:p>
         </p:txBody>
       </p:sp>
-      <mc:AlternateContent xmlns:mc="http://schemas.openxmlformats.org/markup-compatibility/2006">
-        <mc:Choice xmlns:a14="http://schemas.microsoft.com/office/drawing/2010/main" Requires="a14">
+      <mc:AlternateContent xmlns:mc="http://schemas.openxmlformats.org/markup-compatibility/2006" xmlns:a14="http://schemas.microsoft.com/office/drawing/2010/main">
+        <mc:Choice Requires="a14">
           <p:sp>
             <p:nvSpPr>
               <p:cNvPr id="5" name="Content Placeholder 4">
@@ -7815,7 +7811,7 @@
             </p:txBody>
           </p:sp>
         </mc:Choice>
-        <mc:Fallback>
+        <mc:Fallback xmlns="">
           <p:sp>
             <p:nvSpPr>
               <p:cNvPr id="5" name="Content Placeholder 4">

</xml_diff>